<commit_message>
WIP: Manual Vs Auto
</commit_message>
<xml_diff>
--- a/pdffig/figures.pptx
+++ b/pdffig/figures.pptx
@@ -6,8 +6,9 @@
   </p:sldMasterIdLst>
   <p:sldIdLst>
     <p:sldId id="256" r:id="rId2"/>
-    <p:sldId id="257" r:id="rId3"/>
-    <p:sldId id="258" r:id="rId4"/>
+    <p:sldId id="259" r:id="rId3"/>
+    <p:sldId id="257" r:id="rId4"/>
+    <p:sldId id="258" r:id="rId5"/>
   </p:sldIdLst>
   <p:sldSz cx="9144000" cy="6858000" type="screen4x3"/>
   <p:notesSz cx="6858000" cy="9144000"/>
@@ -3928,6 +3929,122 @@
       </p:grpSpPr>
       <p:pic>
         <p:nvPicPr>
+          <p:cNvPr id="5" name="Picture 4"/>
+          <p:cNvPicPr>
+            <a:picLocks noChangeAspect="1"/>
+          </p:cNvPicPr>
+          <p:nvPr/>
+        </p:nvPicPr>
+        <p:blipFill>
+          <a:blip r:embed="rId2"/>
+          <a:stretch>
+            <a:fillRect/>
+          </a:stretch>
+        </p:blipFill>
+        <p:spPr>
+          <a:xfrm>
+            <a:off x="630706" y="1229530"/>
+            <a:ext cx="3225800" cy="2654300"/>
+          </a:xfrm>
+          <a:prstGeom prst="rect">
+            <a:avLst/>
+          </a:prstGeom>
+        </p:spPr>
+      </p:pic>
+      <p:pic>
+        <p:nvPicPr>
+          <p:cNvPr id="6" name="Picture 5"/>
+          <p:cNvPicPr>
+            <a:picLocks noChangeAspect="1"/>
+          </p:cNvPicPr>
+          <p:nvPr/>
+        </p:nvPicPr>
+        <p:blipFill>
+          <a:blip r:embed="rId3"/>
+          <a:stretch>
+            <a:fillRect/>
+          </a:stretch>
+        </p:blipFill>
+        <p:spPr>
+          <a:xfrm>
+            <a:off x="4158318" y="1229530"/>
+            <a:ext cx="3175000" cy="2667000"/>
+          </a:xfrm>
+          <a:prstGeom prst="rect">
+            <a:avLst/>
+          </a:prstGeom>
+        </p:spPr>
+      </p:pic>
+      <p:sp>
+        <p:nvSpPr>
+          <p:cNvPr id="7" name="TextBox 6"/>
+          <p:cNvSpPr txBox="1"/>
+          <p:nvPr/>
+        </p:nvSpPr>
+        <p:spPr>
+          <a:xfrm>
+            <a:off x="630706" y="3785424"/>
+            <a:ext cx="6989494" cy="369332"/>
+          </a:xfrm>
+          <a:prstGeom prst="rect">
+            <a:avLst/>
+          </a:prstGeom>
+          <a:noFill/>
+        </p:spPr>
+        <p:txBody>
+          <a:bodyPr wrap="square" rtlCol="0">
+            <a:spAutoFit/>
+          </a:bodyPr>
+          <a:lstStyle/>
+          <a:p>
+            <a:r>
+              <a:rPr lang="en-US" dirty="0" smtClean="0"/>
+              <a:t>Manual		-</a:t>
+            </a:r>
+            <a:r>
+              <a:rPr lang="en-US" dirty="0" err="1" smtClean="0"/>
+              <a:t>vs</a:t>
+            </a:r>
+            <a:r>
+              <a:rPr lang="en-US" dirty="0" smtClean="0"/>
+              <a:t>-			Automatic</a:t>
+            </a:r>
+            <a:endParaRPr lang="en-US" dirty="0"/>
+          </a:p>
+        </p:txBody>
+      </p:sp>
+    </p:spTree>
+    <p:extLst>
+      <p:ext uri="{BB962C8B-B14F-4D97-AF65-F5344CB8AC3E}">
+        <p14:creationId xmlns:p14="http://schemas.microsoft.com/office/powerpoint/2010/main" val="514155940"/>
+      </p:ext>
+    </p:extLst>
+  </p:cSld>
+  <p:clrMapOvr>
+    <a:masterClrMapping/>
+  </p:clrMapOvr>
+</p:sld>
+</file>
+
+<file path=ppt/slides/slide3.xml><?xml version="1.0" encoding="utf-8"?>
+<p:sld xmlns:a="http://schemas.openxmlformats.org/drawingml/2006/main" xmlns:r="http://schemas.openxmlformats.org/officeDocument/2006/relationships" xmlns:p="http://schemas.openxmlformats.org/presentationml/2006/main">
+  <p:cSld>
+    <p:spTree>
+      <p:nvGrpSpPr>
+        <p:cNvPr id="1" name=""/>
+        <p:cNvGrpSpPr/>
+        <p:nvPr/>
+      </p:nvGrpSpPr>
+      <p:grpSpPr>
+        <a:xfrm>
+          <a:off x="0" y="0"/>
+          <a:ext cx="0" cy="0"/>
+          <a:chOff x="0" y="0"/>
+          <a:chExt cx="0" cy="0"/>
+        </a:xfrm>
+      </p:grpSpPr>
+      <p:pic>
+        <p:nvPicPr>
           <p:cNvPr id="4" name="Picture 3"/>
           <p:cNvPicPr>
             <a:picLocks noChangeAspect="1"/>
@@ -4052,7 +4169,7 @@
 </p:sld>
 </file>
 
-<file path=ppt/slides/slide3.xml><?xml version="1.0" encoding="utf-8"?>
+<file path=ppt/slides/slide4.xml><?xml version="1.0" encoding="utf-8"?>
 <p:sld xmlns:a="http://schemas.openxmlformats.org/drawingml/2006/main" xmlns:r="http://schemas.openxmlformats.org/officeDocument/2006/relationships" xmlns:p="http://schemas.openxmlformats.org/presentationml/2006/main">
   <p:cSld>
     <p:spTree>

</xml_diff>